<commit_message>
Added dashboard slide in ppt
</commit_message>
<xml_diff>
--- a/Crash_Dectectives.pptx
+++ b/Crash_Dectectives.pptx
@@ -5,7 +5,7 @@
     <p:sldMasterId id="2147483672" r:id="rId1"/>
   </p:sldMasterIdLst>
   <p:notesMasterIdLst>
-    <p:notesMasterId r:id="rId12"/>
+    <p:notesMasterId r:id="rId14"/>
   </p:notesMasterIdLst>
   <p:sldIdLst>
     <p:sldId id="256" r:id="rId2"/>
@@ -17,7 +17,9 @@
     <p:sldId id="262" r:id="rId8"/>
     <p:sldId id="263" r:id="rId9"/>
     <p:sldId id="264" r:id="rId10"/>
-    <p:sldId id="259" r:id="rId11"/>
+    <p:sldId id="267" r:id="rId11"/>
+    <p:sldId id="259" r:id="rId12"/>
+    <p:sldId id="266" r:id="rId13"/>
   </p:sldIdLst>
   <p:sldSz cx="12192000" cy="6858000"/>
   <p:notesSz cx="6858000" cy="9144000"/>
@@ -127,8 +129,8 @@
 <file path=ppt/revisionInfo.xml><?xml version="1.0" encoding="utf-8"?>
 <p1510:revInfo xmlns:a="http://schemas.openxmlformats.org/drawingml/2006/main" xmlns:r="http://schemas.openxmlformats.org/officeDocument/2006/relationships" xmlns:p1510="http://schemas.microsoft.com/office/powerpoint/2015/10/main">
   <p1510:revLst>
-    <p1510:client id="{20854ADB-59A1-493D-9435-9219F24ADA32}" v="682" dt="2022-05-14T05:00:50.466"/>
-    <p1510:client id="{2CE6346F-8B59-4A71-AFEE-C619A1FF23EF}" v="843" dt="2022-05-13T21:06:25.378"/>
+    <p1510:client id="{20854ADB-59A1-493D-9435-9219F24ADA32}" v="1048" dt="2022-05-25T20:38:32.731"/>
+    <p1510:client id="{37526190-487B-4D64-84FD-9EFE361ADFB8}" v="2" dt="2022-05-28T17:14:21.825"/>
   </p1510:revLst>
 </p1510:revInfo>
 </file>
@@ -138,7 +140,7 @@
   <pc:docChgLst>
     <pc:chgData name="16479132604" userId="2b8b334a7726c1f8" providerId="LiveId" clId="{20854ADB-59A1-493D-9435-9219F24ADA32}"/>
     <pc:docChg chg="undo redo custSel addSld delSld modSld sldOrd">
-      <pc:chgData name="16479132604" userId="2b8b334a7726c1f8" providerId="LiveId" clId="{20854ADB-59A1-493D-9435-9219F24ADA32}" dt="2022-05-14T05:00:50.466" v="1783"/>
+      <pc:chgData name="16479132604" userId="2b8b334a7726c1f8" providerId="LiveId" clId="{20854ADB-59A1-493D-9435-9219F24ADA32}" dt="2022-05-28T18:44:43.398" v="2381" actId="20577"/>
       <pc:docMkLst>
         <pc:docMk/>
       </pc:docMkLst>
@@ -1109,6 +1111,164 @@
             <pc:docMk/>
             <pc:sldMk cId="2704028374" sldId="265"/>
             <ac:spMk id="3" creationId="{B1910B8A-F8F7-E736-CE46-72A3A6185362}"/>
+          </ac:spMkLst>
+        </pc:spChg>
+      </pc:sldChg>
+      <pc:sldChg chg="addSp delSp modSp new mod setBg setClrOvrMap">
+        <pc:chgData name="16479132604" userId="2b8b334a7726c1f8" providerId="LiveId" clId="{20854ADB-59A1-493D-9435-9219F24ADA32}" dt="2022-05-18T16:50:05.344" v="1848" actId="5793"/>
+        <pc:sldMkLst>
+          <pc:docMk/>
+          <pc:sldMk cId="1687622035" sldId="266"/>
+        </pc:sldMkLst>
+        <pc:spChg chg="mod">
+          <ac:chgData name="16479132604" userId="2b8b334a7726c1f8" providerId="LiveId" clId="{20854ADB-59A1-493D-9435-9219F24ADA32}" dt="2022-05-18T16:42:24.139" v="1802" actId="26606"/>
+          <ac:spMkLst>
+            <pc:docMk/>
+            <pc:sldMk cId="1687622035" sldId="266"/>
+            <ac:spMk id="2" creationId="{10317031-B367-DB06-07FF-49ABB894C921}"/>
+          </ac:spMkLst>
+        </pc:spChg>
+        <pc:spChg chg="mod">
+          <ac:chgData name="16479132604" userId="2b8b334a7726c1f8" providerId="LiveId" clId="{20854ADB-59A1-493D-9435-9219F24ADA32}" dt="2022-05-18T16:50:05.344" v="1848" actId="5793"/>
+          <ac:spMkLst>
+            <pc:docMk/>
+            <pc:sldMk cId="1687622035" sldId="266"/>
+            <ac:spMk id="3" creationId="{0ABBBAA5-EA8A-2364-F01A-62400F5F0581}"/>
+          </ac:spMkLst>
+        </pc:spChg>
+        <pc:spChg chg="add del">
+          <ac:chgData name="16479132604" userId="2b8b334a7726c1f8" providerId="LiveId" clId="{20854ADB-59A1-493D-9435-9219F24ADA32}" dt="2022-05-18T16:42:24.128" v="1801" actId="26606"/>
+          <ac:spMkLst>
+            <pc:docMk/>
+            <pc:sldMk cId="1687622035" sldId="266"/>
+            <ac:spMk id="9" creationId="{E192707B-B929-41A7-9B41-E959A1C689E4}"/>
+          </ac:spMkLst>
+        </pc:spChg>
+        <pc:spChg chg="add del">
+          <ac:chgData name="16479132604" userId="2b8b334a7726c1f8" providerId="LiveId" clId="{20854ADB-59A1-493D-9435-9219F24ADA32}" dt="2022-05-18T16:42:24.128" v="1801" actId="26606"/>
+          <ac:spMkLst>
+            <pc:docMk/>
+            <pc:sldMk cId="1687622035" sldId="266"/>
+            <ac:spMk id="11" creationId="{8FB4235C-4505-46C7-AD8F-8769A1972FC1}"/>
+          </ac:spMkLst>
+        </pc:spChg>
+        <pc:picChg chg="add del">
+          <ac:chgData name="16479132604" userId="2b8b334a7726c1f8" providerId="LiveId" clId="{20854ADB-59A1-493D-9435-9219F24ADA32}" dt="2022-05-18T16:42:24.128" v="1801" actId="26606"/>
+          <ac:picMkLst>
+            <pc:docMk/>
+            <pc:sldMk cId="1687622035" sldId="266"/>
+            <ac:picMk id="5" creationId="{5BA779F3-29B7-E785-042A-D0FB5C3FCCCE}"/>
+          </ac:picMkLst>
+        </pc:picChg>
+        <pc:picChg chg="add">
+          <ac:chgData name="16479132604" userId="2b8b334a7726c1f8" providerId="LiveId" clId="{20854ADB-59A1-493D-9435-9219F24ADA32}" dt="2022-05-18T16:42:24.139" v="1802" actId="26606"/>
+          <ac:picMkLst>
+            <pc:docMk/>
+            <pc:sldMk cId="1687622035" sldId="266"/>
+            <ac:picMk id="13" creationId="{7B56CDA3-B6B4-4E77-19E6-0E018CD6351E}"/>
+          </ac:picMkLst>
+        </pc:picChg>
+      </pc:sldChg>
+      <pc:sldChg chg="addSp delSp modSp new mod setBg setClrOvrMap">
+        <pc:chgData name="16479132604" userId="2b8b334a7726c1f8" providerId="LiveId" clId="{20854ADB-59A1-493D-9435-9219F24ADA32}" dt="2022-05-28T18:44:43.398" v="2381" actId="20577"/>
+        <pc:sldMkLst>
+          <pc:docMk/>
+          <pc:sldMk cId="3995222830" sldId="267"/>
+        </pc:sldMkLst>
+        <pc:spChg chg="mod">
+          <ac:chgData name="16479132604" userId="2b8b334a7726c1f8" providerId="LiveId" clId="{20854ADB-59A1-493D-9435-9219F24ADA32}" dt="2022-05-28T18:44:43.398" v="2381" actId="20577"/>
+          <ac:spMkLst>
+            <pc:docMk/>
+            <pc:sldMk cId="3995222830" sldId="267"/>
+            <ac:spMk id="2" creationId="{C3C101A1-9025-8906-21FF-545142D48276}"/>
+          </ac:spMkLst>
+        </pc:spChg>
+        <pc:spChg chg="del mod">
+          <ac:chgData name="16479132604" userId="2b8b334a7726c1f8" providerId="LiveId" clId="{20854ADB-59A1-493D-9435-9219F24ADA32}" dt="2022-05-27T16:12:24.171" v="2246" actId="22"/>
+          <ac:spMkLst>
+            <pc:docMk/>
+            <pc:sldMk cId="3995222830" sldId="267"/>
+            <ac:spMk id="3" creationId="{8B174699-3222-163B-F417-AF82BEB7021C}"/>
+          </ac:spMkLst>
+        </pc:spChg>
+        <pc:spChg chg="add">
+          <ac:chgData name="16479132604" userId="2b8b334a7726c1f8" providerId="LiveId" clId="{20854ADB-59A1-493D-9435-9219F24ADA32}" dt="2022-05-25T20:36:54.267" v="1875" actId="26606"/>
+          <ac:spMkLst>
+            <pc:docMk/>
+            <pc:sldMk cId="3995222830" sldId="267"/>
+            <ac:spMk id="9" creationId="{E192707B-B929-41A7-9B41-E959A1C689E4}"/>
+          </ac:spMkLst>
+        </pc:spChg>
+        <pc:spChg chg="add">
+          <ac:chgData name="16479132604" userId="2b8b334a7726c1f8" providerId="LiveId" clId="{20854ADB-59A1-493D-9435-9219F24ADA32}" dt="2022-05-25T20:36:54.267" v="1875" actId="26606"/>
+          <ac:spMkLst>
+            <pc:docMk/>
+            <pc:sldMk cId="3995222830" sldId="267"/>
+            <ac:spMk id="11" creationId="{8FB4235C-4505-46C7-AD8F-8769A1972FC1}"/>
+          </ac:spMkLst>
+        </pc:spChg>
+        <pc:picChg chg="add mod">
+          <ac:chgData name="16479132604" userId="2b8b334a7726c1f8" providerId="LiveId" clId="{20854ADB-59A1-493D-9435-9219F24ADA32}" dt="2022-05-28T03:56:54.453" v="2363" actId="14100"/>
+          <ac:picMkLst>
+            <pc:docMk/>
+            <pc:sldMk cId="3995222830" sldId="267"/>
+            <ac:picMk id="4" creationId="{2871B7B2-8767-2F8B-21AE-0624414C0DCC}"/>
+          </ac:picMkLst>
+        </pc:picChg>
+        <pc:picChg chg="add mod">
+          <ac:chgData name="16479132604" userId="2b8b334a7726c1f8" providerId="LiveId" clId="{20854ADB-59A1-493D-9435-9219F24ADA32}" dt="2022-05-26T15:11:48.138" v="2244" actId="1076"/>
+          <ac:picMkLst>
+            <pc:docMk/>
+            <pc:sldMk cId="3995222830" sldId="267"/>
+            <ac:picMk id="5" creationId="{40FA4201-4F15-7B20-335A-AA42F565835E}"/>
+          </ac:picMkLst>
+        </pc:picChg>
+        <pc:picChg chg="add mod ord">
+          <ac:chgData name="16479132604" userId="2b8b334a7726c1f8" providerId="LiveId" clId="{20854ADB-59A1-493D-9435-9219F24ADA32}" dt="2022-05-27T16:12:34.567" v="2247" actId="1076"/>
+          <ac:picMkLst>
+            <pc:docMk/>
+            <pc:sldMk cId="3995222830" sldId="267"/>
+            <ac:picMk id="6" creationId="{DFEE222A-2081-9C80-C154-EBFF94D82B01}"/>
+          </ac:picMkLst>
+        </pc:picChg>
+        <pc:picChg chg="add del mod modCrop">
+          <ac:chgData name="16479132604" userId="2b8b334a7726c1f8" providerId="LiveId" clId="{20854ADB-59A1-493D-9435-9219F24ADA32}" dt="2022-05-27T16:18:18.851" v="2254" actId="478"/>
+          <ac:picMkLst>
+            <pc:docMk/>
+            <pc:sldMk cId="3995222830" sldId="267"/>
+            <ac:picMk id="8" creationId="{7087EB77-8A0F-4CAE-A525-24039BFCE87A}"/>
+          </ac:picMkLst>
+        </pc:picChg>
+        <pc:picChg chg="add del mod">
+          <ac:chgData name="16479132604" userId="2b8b334a7726c1f8" providerId="LiveId" clId="{20854ADB-59A1-493D-9435-9219F24ADA32}" dt="2022-05-28T03:56:37.780" v="2358" actId="478"/>
+          <ac:picMkLst>
+            <pc:docMk/>
+            <pc:sldMk cId="3995222830" sldId="267"/>
+            <ac:picMk id="12" creationId="{8D326665-0AAB-5021-C79D-CD040B25278C}"/>
+          </ac:picMkLst>
+        </pc:picChg>
+      </pc:sldChg>
+    </pc:docChg>
+  </pc:docChgLst>
+  <pc:docChgLst>
+    <pc:chgData name="Qin Richelle" userId="8c8fc80d10a85a95" providerId="Windows Live" clId="Web-{37526190-487B-4D64-84FD-9EFE361ADFB8}"/>
+    <pc:docChg chg="modSld">
+      <pc:chgData name="Qin Richelle" userId="8c8fc80d10a85a95" providerId="Windows Live" clId="Web-{37526190-487B-4D64-84FD-9EFE361ADFB8}" dt="2022-05-28T17:14:21.825" v="1" actId="20577"/>
+      <pc:docMkLst>
+        <pc:docMk/>
+      </pc:docMkLst>
+      <pc:sldChg chg="modSp">
+        <pc:chgData name="Qin Richelle" userId="8c8fc80d10a85a95" providerId="Windows Live" clId="Web-{37526190-487B-4D64-84FD-9EFE361ADFB8}" dt="2022-05-28T17:14:21.825" v="1" actId="20577"/>
+        <pc:sldMkLst>
+          <pc:docMk/>
+          <pc:sldMk cId="2704028374" sldId="265"/>
+        </pc:sldMkLst>
+        <pc:spChg chg="mod">
+          <ac:chgData name="Qin Richelle" userId="8c8fc80d10a85a95" providerId="Windows Live" clId="Web-{37526190-487B-4D64-84FD-9EFE361ADFB8}" dt="2022-05-28T17:14:21.825" v="1" actId="20577"/>
+          <ac:spMkLst>
+            <pc:docMk/>
+            <pc:sldMk cId="2704028374" sldId="265"/>
+            <ac:spMk id="2" creationId="{4E1C5FAE-7400-9BAB-FF7E-A9C1D41DC739}"/>
           </ac:spMkLst>
         </pc:spChg>
       </pc:sldChg>
@@ -9000,7 +9160,7 @@
       </dsp:nvSpPr>
       <dsp:spPr>
         <a:xfrm>
-          <a:off x="938775" y="812201"/>
+          <a:off x="938775" y="825313"/>
           <a:ext cx="926133" cy="926133"/>
         </a:xfrm>
         <a:prstGeom prst="rect">
@@ -9056,8 +9216,8 @@
       </dsp:nvSpPr>
       <dsp:spPr>
         <a:xfrm>
-          <a:off x="372805" y="2084718"/>
-          <a:ext cx="2058075" cy="1035000"/>
+          <a:off x="372805" y="2094106"/>
+          <a:ext cx="2058075" cy="1012500"/>
         </a:xfrm>
         <a:prstGeom prst="rect">
           <a:avLst/>
@@ -9136,8 +9296,8 @@
         </a:p>
       </dsp:txBody>
       <dsp:txXfrm>
-        <a:off x="372805" y="2084718"/>
-        <a:ext cx="2058075" cy="1035000"/>
+        <a:off x="372805" y="2094106"/>
+        <a:ext cx="2058075" cy="1012500"/>
       </dsp:txXfrm>
     </dsp:sp>
     <dsp:sp modelId="{8EAAA964-8E2B-498B-B57F-6600E0E28736}">
@@ -9147,7 +9307,7 @@
       </dsp:nvSpPr>
       <dsp:spPr>
         <a:xfrm>
-          <a:off x="3357014" y="812201"/>
+          <a:off x="3357014" y="825313"/>
           <a:ext cx="926133" cy="926133"/>
         </a:xfrm>
         <a:prstGeom prst="rect">
@@ -9203,8 +9363,8 @@
       </dsp:nvSpPr>
       <dsp:spPr>
         <a:xfrm>
-          <a:off x="2791043" y="2084718"/>
-          <a:ext cx="2058075" cy="1035000"/>
+          <a:off x="2791043" y="2094106"/>
+          <a:ext cx="2058075" cy="1012500"/>
         </a:xfrm>
         <a:prstGeom prst="rect">
           <a:avLst/>
@@ -9257,8 +9417,8 @@
         </a:p>
       </dsp:txBody>
       <dsp:txXfrm>
-        <a:off x="2791043" y="2084718"/>
-        <a:ext cx="2058075" cy="1035000"/>
+        <a:off x="2791043" y="2094106"/>
+        <a:ext cx="2058075" cy="1012500"/>
       </dsp:txXfrm>
     </dsp:sp>
     <dsp:sp modelId="{32B8D066-84EE-49CE-8005-3AED134EEC3C}">
@@ -9268,7 +9428,7 @@
       </dsp:nvSpPr>
       <dsp:spPr>
         <a:xfrm>
-          <a:off x="5775252" y="812201"/>
+          <a:off x="5775252" y="825313"/>
           <a:ext cx="926133" cy="926133"/>
         </a:xfrm>
         <a:prstGeom prst="rect">
@@ -9324,8 +9484,8 @@
       </dsp:nvSpPr>
       <dsp:spPr>
         <a:xfrm>
-          <a:off x="5209281" y="2084718"/>
-          <a:ext cx="2058075" cy="1035000"/>
+          <a:off x="5209281" y="2094106"/>
+          <a:ext cx="2058075" cy="1012500"/>
         </a:xfrm>
         <a:prstGeom prst="rect">
           <a:avLst/>
@@ -9414,8 +9574,8 @@
         </a:p>
       </dsp:txBody>
       <dsp:txXfrm>
-        <a:off x="5209281" y="2084718"/>
-        <a:ext cx="2058075" cy="1035000"/>
+        <a:off x="5209281" y="2094106"/>
+        <a:ext cx="2058075" cy="1012500"/>
       </dsp:txXfrm>
     </dsp:sp>
     <dsp:sp modelId="{75B9D01C-5576-4BF4-929B-54F65585080C}">
@@ -9425,7 +9585,7 @@
       </dsp:nvSpPr>
       <dsp:spPr>
         <a:xfrm>
-          <a:off x="8193490" y="812201"/>
+          <a:off x="8193490" y="825313"/>
           <a:ext cx="926133" cy="926133"/>
         </a:xfrm>
         <a:prstGeom prst="rect">
@@ -9481,8 +9641,8 @@
       </dsp:nvSpPr>
       <dsp:spPr>
         <a:xfrm>
-          <a:off x="7627519" y="2084718"/>
-          <a:ext cx="2058075" cy="1035000"/>
+          <a:off x="7627519" y="2094106"/>
+          <a:ext cx="2058075" cy="1012500"/>
         </a:xfrm>
         <a:prstGeom prst="rect">
           <a:avLst/>
@@ -9553,8 +9713,8 @@
         </a:p>
       </dsp:txBody>
       <dsp:txXfrm>
-        <a:off x="7627519" y="2084718"/>
-        <a:ext cx="2058075" cy="1035000"/>
+        <a:off x="7627519" y="2094106"/>
+        <a:ext cx="2058075" cy="1012500"/>
       </dsp:txXfrm>
     </dsp:sp>
   </dsp:spTree>
@@ -12048,7 +12208,7 @@
           <a:p>
             <a:fld id="{1D22FE4A-D7B1-44C6-B419-3891A711769A}" type="datetimeFigureOut">
               <a:rPr lang="en-CA" smtClean="0"/>
-              <a:t>2022-05-13</a:t>
+              <a:t>2022-05-28</a:t>
             </a:fld>
             <a:endParaRPr lang="en-CA"/>
           </a:p>
@@ -12862,7 +13022,7 @@
           <a:p>
             <a:fld id="{61784475-BEFB-4B4E-885B-3643F77986B9}" type="datetimeFigureOut">
               <a:rPr lang="en-CA" smtClean="0"/>
-              <a:t>2022-05-13</a:t>
+              <a:t>2022-05-28</a:t>
             </a:fld>
             <a:endParaRPr lang="en-CA"/>
           </a:p>
@@ -13064,7 +13224,7 @@
           <a:p>
             <a:fld id="{61784475-BEFB-4B4E-885B-3643F77986B9}" type="datetimeFigureOut">
               <a:rPr lang="en-CA" smtClean="0"/>
-              <a:t>2022-05-13</a:t>
+              <a:t>2022-05-28</a:t>
             </a:fld>
             <a:endParaRPr lang="en-CA"/>
           </a:p>
@@ -13244,7 +13404,7 @@
           <a:p>
             <a:fld id="{61784475-BEFB-4B4E-885B-3643F77986B9}" type="datetimeFigureOut">
               <a:rPr lang="en-CA" smtClean="0"/>
-              <a:t>2022-05-13</a:t>
+              <a:t>2022-05-28</a:t>
             </a:fld>
             <a:endParaRPr lang="en-CA"/>
           </a:p>
@@ -13414,7 +13574,7 @@
           <a:p>
             <a:fld id="{61784475-BEFB-4B4E-885B-3643F77986B9}" type="datetimeFigureOut">
               <a:rPr lang="en-CA" smtClean="0"/>
-              <a:t>2022-05-13</a:t>
+              <a:t>2022-05-28</a:t>
             </a:fld>
             <a:endParaRPr lang="en-CA"/>
           </a:p>
@@ -13985,7 +14145,7 @@
           <a:p>
             <a:fld id="{61784475-BEFB-4B4E-885B-3643F77986B9}" type="datetimeFigureOut">
               <a:rPr lang="en-CA" smtClean="0"/>
-              <a:t>2022-05-13</a:t>
+              <a:t>2022-05-28</a:t>
             </a:fld>
             <a:endParaRPr lang="en-CA"/>
           </a:p>
@@ -14287,7 +14447,7 @@
           <a:p>
             <a:fld id="{61784475-BEFB-4B4E-885B-3643F77986B9}" type="datetimeFigureOut">
               <a:rPr lang="en-CA" smtClean="0"/>
-              <a:t>2022-05-13</a:t>
+              <a:t>2022-05-28</a:t>
             </a:fld>
             <a:endParaRPr lang="en-CA"/>
           </a:p>
@@ -14724,7 +14884,7 @@
           <a:p>
             <a:fld id="{61784475-BEFB-4B4E-885B-3643F77986B9}" type="datetimeFigureOut">
               <a:rPr lang="en-CA" smtClean="0"/>
-              <a:t>2022-05-13</a:t>
+              <a:t>2022-05-28</a:t>
             </a:fld>
             <a:endParaRPr lang="en-CA"/>
           </a:p>
@@ -14842,7 +15002,7 @@
           <a:p>
             <a:fld id="{61784475-BEFB-4B4E-885B-3643F77986B9}" type="datetimeFigureOut">
               <a:rPr lang="en-CA" smtClean="0"/>
-              <a:t>2022-05-13</a:t>
+              <a:t>2022-05-28</a:t>
             </a:fld>
             <a:endParaRPr lang="en-CA"/>
           </a:p>
@@ -14937,7 +15097,7 @@
           <a:p>
             <a:fld id="{61784475-BEFB-4B4E-885B-3643F77986B9}" type="datetimeFigureOut">
               <a:rPr lang="en-CA" smtClean="0"/>
-              <a:t>2022-05-13</a:t>
+              <a:t>2022-05-28</a:t>
             </a:fld>
             <a:endParaRPr lang="en-CA"/>
           </a:p>
@@ -15319,7 +15479,7 @@
           <a:p>
             <a:fld id="{61784475-BEFB-4B4E-885B-3643F77986B9}" type="datetimeFigureOut">
               <a:rPr lang="en-CA" smtClean="0"/>
-              <a:t>2022-05-13</a:t>
+              <a:t>2022-05-28</a:t>
             </a:fld>
             <a:endParaRPr lang="en-CA"/>
           </a:p>
@@ -15713,7 +15873,7 @@
           <a:p>
             <a:fld id="{61784475-BEFB-4B4E-885B-3643F77986B9}" type="datetimeFigureOut">
               <a:rPr lang="en-CA" smtClean="0"/>
-              <a:t>2022-05-13</a:t>
+              <a:t>2022-05-28</a:t>
             </a:fld>
             <a:endParaRPr lang="en-CA"/>
           </a:p>
@@ -16026,7 +16186,7 @@
           <a:p>
             <a:fld id="{61784475-BEFB-4B4E-885B-3643F77986B9}" type="datetimeFigureOut">
               <a:rPr lang="en-CA" smtClean="0"/>
-              <a:t>2022-05-13</a:t>
+              <a:t>2022-05-28</a:t>
             </a:fld>
             <a:endParaRPr lang="en-CA"/>
           </a:p>
@@ -16836,6 +16996,276 @@
       <p:bgPr>
         <a:solidFill>
           <a:schemeClr val="bg1">
+            <a:lumMod val="75000"/>
+            <a:lumOff val="25000"/>
+          </a:schemeClr>
+        </a:solidFill>
+        <a:effectLst/>
+      </p:bgPr>
+    </p:bg>
+    <p:spTree>
+      <p:nvGrpSpPr>
+        <p:cNvPr id="1" name=""/>
+        <p:cNvGrpSpPr/>
+        <p:nvPr/>
+      </p:nvGrpSpPr>
+      <p:grpSpPr>
+        <a:xfrm>
+          <a:off x="0" y="0"/>
+          <a:ext cx="0" cy="0"/>
+          <a:chOff x="0" y="0"/>
+          <a:chExt cx="0" cy="0"/>
+        </a:xfrm>
+      </p:grpSpPr>
+      <p:sp useBgFill="1">
+        <p:nvSpPr>
+          <p:cNvPr id="9" name="Rectangle 8">
+            <a:extLst>
+              <a:ext uri="{FF2B5EF4-FFF2-40B4-BE49-F238E27FC236}">
+                <a16:creationId xmlns:a16="http://schemas.microsoft.com/office/drawing/2014/main" id="{E192707B-B929-41A7-9B41-E959A1C689E4}"/>
+              </a:ext>
+              <a:ext uri="{C183D7F6-B498-43B3-948B-1728B52AA6E4}">
+                <adec:decorative xmlns:adec="http://schemas.microsoft.com/office/drawing/2017/decorative" val="1"/>
+              </a:ext>
+            </a:extLst>
+          </p:cNvPr>
+          <p:cNvSpPr>
+            <a:spLocks noGrp="1" noRot="1" noChangeAspect="1" noMove="1" noResize="1" noEditPoints="1" noAdjustHandles="1" noChangeArrowheads="1" noChangeShapeType="1" noTextEdit="1"/>
+          </p:cNvSpPr>
+          <p:nvPr>
+            <p:extLst>
+              <p:ext uri="{386F3935-93C4-4BCD-93E2-E3B085C9AB24}">
+                <p16:designElem xmlns:p16="http://schemas.microsoft.com/office/powerpoint/2015/main" val="1"/>
+              </p:ext>
+            </p:extLst>
+          </p:nvPr>
+        </p:nvSpPr>
+        <p:spPr>
+          <a:xfrm>
+            <a:off x="0" y="0"/>
+            <a:ext cx="12192000" cy="6858000"/>
+          </a:xfrm>
+          <a:prstGeom prst="rect">
+            <a:avLst/>
+          </a:prstGeom>
+          <a:ln>
+            <a:noFill/>
+          </a:ln>
+        </p:spPr>
+        <p:style>
+          <a:lnRef idx="2">
+            <a:schemeClr val="accent1">
+              <a:shade val="50000"/>
+            </a:schemeClr>
+          </a:lnRef>
+          <a:fillRef idx="1">
+            <a:schemeClr val="accent1"/>
+          </a:fillRef>
+          <a:effectRef idx="0">
+            <a:schemeClr val="accent1"/>
+          </a:effectRef>
+          <a:fontRef idx="minor">
+            <a:schemeClr val="lt1"/>
+          </a:fontRef>
+        </p:style>
+        <p:txBody>
+          <a:bodyPr rtlCol="0" anchor="ctr"/>
+          <a:lstStyle/>
+          <a:p>
+            <a:pPr algn="ctr"/>
+            <a:endParaRPr lang="en-US"/>
+          </a:p>
+        </p:txBody>
+      </p:sp>
+      <p:pic>
+        <p:nvPicPr>
+          <p:cNvPr id="5" name="Picture 4" descr="Speedometer">
+            <a:extLst>
+              <a:ext uri="{FF2B5EF4-FFF2-40B4-BE49-F238E27FC236}">
+                <a16:creationId xmlns:a16="http://schemas.microsoft.com/office/drawing/2014/main" id="{40FA4201-4F15-7B20-335A-AA42F565835E}"/>
+              </a:ext>
+            </a:extLst>
+          </p:cNvPr>
+          <p:cNvPicPr>
+            <a:picLocks noChangeAspect="1"/>
+          </p:cNvPicPr>
+          <p:nvPr/>
+        </p:nvPicPr>
+        <p:blipFill rotWithShape="1">
+          <a:blip r:embed="rId2">
+            <a:alphaModFix amt="35000"/>
+          </a:blip>
+          <a:srcRect t="5645" b="3994"/>
+          <a:stretch/>
+        </p:blipFill>
+        <p:spPr>
+          <a:xfrm>
+            <a:off x="20" y="10"/>
+            <a:ext cx="12191980" cy="6857990"/>
+          </a:xfrm>
+          <a:prstGeom prst="rect">
+            <a:avLst/>
+          </a:prstGeom>
+        </p:spPr>
+      </p:pic>
+      <p:sp>
+        <p:nvSpPr>
+          <p:cNvPr id="2" name="Title 1">
+            <a:extLst>
+              <a:ext uri="{FF2B5EF4-FFF2-40B4-BE49-F238E27FC236}">
+                <a16:creationId xmlns:a16="http://schemas.microsoft.com/office/drawing/2014/main" id="{C3C101A1-9025-8906-21FF-545142D48276}"/>
+              </a:ext>
+            </a:extLst>
+          </p:cNvPr>
+          <p:cNvSpPr>
+            <a:spLocks noGrp="1"/>
+          </p:cNvSpPr>
+          <p:nvPr>
+            <p:ph type="title"/>
+          </p:nvPr>
+        </p:nvSpPr>
+        <p:spPr>
+          <a:xfrm>
+            <a:off x="1066800" y="434776"/>
+            <a:ext cx="10058400" cy="1371600"/>
+          </a:xfrm>
+        </p:spPr>
+        <p:txBody>
+          <a:bodyPr>
+            <a:normAutofit/>
+          </a:bodyPr>
+          <a:lstStyle/>
+          <a:p>
+            <a:r>
+              <a:rPr lang="en-CA" dirty="0"/>
+              <a:t>A glimpse of the Dashboard</a:t>
+            </a:r>
+          </a:p>
+        </p:txBody>
+      </p:sp>
+      <p:pic>
+        <p:nvPicPr>
+          <p:cNvPr id="6" name="Content Placeholder 5">
+            <a:extLst>
+              <a:ext uri="{FF2B5EF4-FFF2-40B4-BE49-F238E27FC236}">
+                <a16:creationId xmlns:a16="http://schemas.microsoft.com/office/drawing/2014/main" id="{DFEE222A-2081-9C80-C154-EBFF94D82B01}"/>
+              </a:ext>
+            </a:extLst>
+          </p:cNvPr>
+          <p:cNvPicPr>
+            <a:picLocks noGrp="1" noChangeAspect="1"/>
+          </p:cNvPicPr>
+          <p:nvPr>
+            <p:ph idx="1"/>
+          </p:nvPr>
+        </p:nvPicPr>
+        <p:blipFill>
+          <a:blip r:embed="rId3"/>
+          <a:stretch>
+            <a:fillRect/>
+          </a:stretch>
+        </p:blipFill>
+        <p:spPr>
+          <a:xfrm>
+            <a:off x="524767" y="2139084"/>
+            <a:ext cx="5190554" cy="3932238"/>
+          </a:xfrm>
+        </p:spPr>
+      </p:pic>
+      <p:sp>
+        <p:nvSpPr>
+          <p:cNvPr id="11" name="Rectangle 10">
+            <a:extLst>
+              <a:ext uri="{FF2B5EF4-FFF2-40B4-BE49-F238E27FC236}">
+                <a16:creationId xmlns:a16="http://schemas.microsoft.com/office/drawing/2014/main" id="{8FB4235C-4505-46C7-AD8F-8769A1972FC1}"/>
+              </a:ext>
+              <a:ext uri="{C183D7F6-B498-43B3-948B-1728B52AA6E4}">
+                <adec:decorative xmlns:adec="http://schemas.microsoft.com/office/drawing/2017/decorative" val="1"/>
+              </a:ext>
+            </a:extLst>
+          </p:cNvPr>
+          <p:cNvSpPr>
+            <a:spLocks noGrp="1" noRot="1" noChangeAspect="1" noMove="1" noResize="1" noEditPoints="1" noAdjustHandles="1" noChangeArrowheads="1" noChangeShapeType="1" noTextEdit="1"/>
+          </p:cNvSpPr>
+          <p:nvPr>
+            <p:extLst>
+              <p:ext uri="{386F3935-93C4-4BCD-93E2-E3B085C9AB24}">
+                <p16:designElem xmlns:p16="http://schemas.microsoft.com/office/powerpoint/2015/main" val="1"/>
+              </p:ext>
+            </p:extLst>
+          </p:nvPr>
+        </p:nvSpPr>
+        <p:spPr>
+          <a:xfrm>
+            <a:off x="234696" y="237744"/>
+            <a:ext cx="11722608" cy="6382512"/>
+          </a:xfrm>
+          <a:prstGeom prst="rect">
+            <a:avLst/>
+          </a:prstGeom>
+          <a:noFill/>
+          <a:ln w="6350" cap="sq" cmpd="sng" algn="ctr">
+            <a:solidFill>
+              <a:schemeClr val="tx1"/>
+            </a:solidFill>
+            <a:prstDash val="solid"/>
+            <a:miter lim="800000"/>
+          </a:ln>
+          <a:effectLst>
+            <a:softEdge rad="0"/>
+          </a:effectLst>
+        </p:spPr>
+      </p:sp>
+      <p:pic>
+        <p:nvPicPr>
+          <p:cNvPr id="4" name="Picture 3">
+            <a:extLst>
+              <a:ext uri="{FF2B5EF4-FFF2-40B4-BE49-F238E27FC236}">
+                <a16:creationId xmlns:a16="http://schemas.microsoft.com/office/drawing/2014/main" id="{2871B7B2-8767-2F8B-21AE-0624414C0DCC}"/>
+              </a:ext>
+            </a:extLst>
+          </p:cNvPr>
+          <p:cNvPicPr>
+            <a:picLocks noChangeAspect="1"/>
+          </p:cNvPicPr>
+          <p:nvPr/>
+        </p:nvPicPr>
+        <p:blipFill>
+          <a:blip r:embed="rId4"/>
+          <a:stretch>
+            <a:fillRect/>
+          </a:stretch>
+        </p:blipFill>
+        <p:spPr>
+          <a:xfrm>
+            <a:off x="6096000" y="2139084"/>
+            <a:ext cx="4951615" cy="3932238"/>
+          </a:xfrm>
+          <a:prstGeom prst="rect">
+            <a:avLst/>
+          </a:prstGeom>
+        </p:spPr>
+      </p:pic>
+    </p:spTree>
+    <p:extLst>
+      <p:ext uri="{BB962C8B-B14F-4D97-AF65-F5344CB8AC3E}">
+        <p14:creationId xmlns:p14="http://schemas.microsoft.com/office/powerpoint/2010/main" val="3995222830"/>
+      </p:ext>
+    </p:extLst>
+  </p:cSld>
+  <p:clrMapOvr>
+    <a:overrideClrMapping bg1="dk1" tx1="lt1" bg2="dk2" tx2="lt2" accent1="accent1" accent2="accent2" accent3="accent3" accent4="accent4" accent5="accent5" accent6="accent6" hlink="hlink" folHlink="folHlink"/>
+  </p:clrMapOvr>
+</p:sld>
+</file>
+
+<file path=ppt/slides/slide11.xml><?xml version="1.0" encoding="utf-8"?>
+<p:sld xmlns:a="http://schemas.openxmlformats.org/drawingml/2006/main" xmlns:r="http://schemas.openxmlformats.org/officeDocument/2006/relationships" xmlns:p="http://schemas.openxmlformats.org/presentationml/2006/main">
+  <p:cSld>
+    <p:bg>
+      <p:bgPr>
+        <a:solidFill>
+          <a:schemeClr val="bg1">
             <a:lumMod val="95000"/>
             <a:lumOff val="5000"/>
           </a:schemeClr>
@@ -17350,8 +17780,8 @@
   <p:clrMapOvr>
     <a:overrideClrMapping bg1="dk1" tx1="lt1" bg2="dk2" tx2="lt2" accent1="accent1" accent2="accent2" accent3="accent3" accent4="accent4" accent5="accent5" accent6="accent6" hlink="hlink" folHlink="folHlink"/>
   </p:clrMapOvr>
-  <mc:AlternateContent xmlns:mc="http://schemas.openxmlformats.org/markup-compatibility/2006">
-    <mc:Choice xmlns:p14="http://schemas.microsoft.com/office/powerpoint/2010/main" Requires="p14">
+  <mc:AlternateContent xmlns:mc="http://schemas.openxmlformats.org/markup-compatibility/2006" xmlns:p14="http://schemas.microsoft.com/office/powerpoint/2010/main">
+    <mc:Choice Requires="p14">
       <p:timing>
         <p:tnLst>
           <p:par>
@@ -17424,7 +17854,7 @@
         </p:tnLst>
       </p:timing>
     </mc:Choice>
-    <mc:Fallback>
+    <mc:Fallback xmlns="">
       <p:timing>
         <p:tnLst>
           <p:par>
@@ -17498,6 +17928,170 @@
       </p:timing>
     </mc:Fallback>
   </mc:AlternateContent>
+</p:sld>
+</file>
+
+<file path=ppt/slides/slide12.xml><?xml version="1.0" encoding="utf-8"?>
+<p:sld xmlns:a="http://schemas.openxmlformats.org/drawingml/2006/main" xmlns:r="http://schemas.openxmlformats.org/officeDocument/2006/relationships" xmlns:p="http://schemas.openxmlformats.org/presentationml/2006/main">
+  <p:cSld>
+    <p:bg>
+      <p:bgPr>
+        <a:solidFill>
+          <a:schemeClr val="bg1"/>
+        </a:solidFill>
+        <a:effectLst/>
+      </p:bgPr>
+    </p:bg>
+    <p:spTree>
+      <p:nvGrpSpPr>
+        <p:cNvPr id="1" name=""/>
+        <p:cNvGrpSpPr/>
+        <p:nvPr/>
+      </p:nvGrpSpPr>
+      <p:grpSpPr>
+        <a:xfrm>
+          <a:off x="0" y="0"/>
+          <a:ext cx="0" cy="0"/>
+          <a:chOff x="0" y="0"/>
+          <a:chExt cx="0" cy="0"/>
+        </a:xfrm>
+      </p:grpSpPr>
+      <p:pic>
+        <p:nvPicPr>
+          <p:cNvPr id="13" name="Picture 4" descr="Files in folders">
+            <a:extLst>
+              <a:ext uri="{FF2B5EF4-FFF2-40B4-BE49-F238E27FC236}">
+                <a16:creationId xmlns:a16="http://schemas.microsoft.com/office/drawing/2014/main" id="{7B56CDA3-B6B4-4E77-19E6-0E018CD6351E}"/>
+              </a:ext>
+            </a:extLst>
+          </p:cNvPr>
+          <p:cNvPicPr>
+            <a:picLocks noChangeAspect="1"/>
+          </p:cNvPicPr>
+          <p:nvPr/>
+        </p:nvPicPr>
+        <p:blipFill rotWithShape="1">
+          <a:blip r:embed="rId2">
+            <a:duotone>
+              <a:schemeClr val="bg2">
+                <a:shade val="45000"/>
+                <a:satMod val="135000"/>
+              </a:schemeClr>
+              <a:prstClr val="white"/>
+            </a:duotone>
+            <a:alphaModFix amt="25000"/>
+          </a:blip>
+          <a:srcRect t="4773" b="10957"/>
+          <a:stretch/>
+        </p:blipFill>
+        <p:spPr>
+          <a:xfrm>
+            <a:off x="20" y="10"/>
+            <a:ext cx="12191980" cy="6857990"/>
+          </a:xfrm>
+          <a:prstGeom prst="rect">
+            <a:avLst/>
+          </a:prstGeom>
+        </p:spPr>
+      </p:pic>
+      <p:sp>
+        <p:nvSpPr>
+          <p:cNvPr id="2" name="Title 1">
+            <a:extLst>
+              <a:ext uri="{FF2B5EF4-FFF2-40B4-BE49-F238E27FC236}">
+                <a16:creationId xmlns:a16="http://schemas.microsoft.com/office/drawing/2014/main" id="{10317031-B367-DB06-07FF-49ABB894C921}"/>
+              </a:ext>
+            </a:extLst>
+          </p:cNvPr>
+          <p:cNvSpPr>
+            <a:spLocks noGrp="1"/>
+          </p:cNvSpPr>
+          <p:nvPr>
+            <p:ph type="title"/>
+          </p:nvPr>
+        </p:nvSpPr>
+        <p:spPr>
+          <a:xfrm>
+            <a:off x="1066800" y="642594"/>
+            <a:ext cx="10058400" cy="1371600"/>
+          </a:xfrm>
+        </p:spPr>
+        <p:txBody>
+          <a:bodyPr>
+            <a:normAutofit/>
+          </a:bodyPr>
+          <a:lstStyle/>
+          <a:p>
+            <a:r>
+              <a:rPr lang="en-CA" dirty="0"/>
+              <a:t>References </a:t>
+            </a:r>
+          </a:p>
+        </p:txBody>
+      </p:sp>
+      <p:sp>
+        <p:nvSpPr>
+          <p:cNvPr id="3" name="Content Placeholder 2">
+            <a:extLst>
+              <a:ext uri="{FF2B5EF4-FFF2-40B4-BE49-F238E27FC236}">
+                <a16:creationId xmlns:a16="http://schemas.microsoft.com/office/drawing/2014/main" id="{0ABBBAA5-EA8A-2364-F01A-62400F5F0581}"/>
+              </a:ext>
+            </a:extLst>
+          </p:cNvPr>
+          <p:cNvSpPr>
+            <a:spLocks noGrp="1"/>
+          </p:cNvSpPr>
+          <p:nvPr>
+            <p:ph idx="1"/>
+          </p:nvPr>
+        </p:nvSpPr>
+        <p:spPr>
+          <a:xfrm>
+            <a:off x="1066800" y="2103120"/>
+            <a:ext cx="10058400" cy="3931920"/>
+          </a:xfrm>
+        </p:spPr>
+        <p:txBody>
+          <a:bodyPr>
+            <a:normAutofit/>
+          </a:bodyPr>
+          <a:lstStyle/>
+          <a:p>
+            <a:r>
+              <a:rPr lang="en-CA" dirty="0"/>
+              <a:t>City of Toronto open data portal - </a:t>
+            </a:r>
+            <a:r>
+              <a:rPr lang="en-US" b="0" i="0">
+                <a:effectLst/>
+                <a:latin typeface="Montserrat" panose="020B0604020202020204" pitchFamily="2" charset="0"/>
+                <a:hlinkClick r:id="rId3"/>
+              </a:rPr>
+              <a:t>Link to portal</a:t>
+            </a:r>
+            <a:endParaRPr lang="en-US" b="0" i="0">
+              <a:effectLst/>
+              <a:latin typeface="Montserrat" panose="020B0604020202020204" pitchFamily="2" charset="0"/>
+            </a:endParaRPr>
+          </a:p>
+          <a:p>
+            <a:pPr marL="0" indent="0">
+              <a:buNone/>
+            </a:pPr>
+            <a:endParaRPr lang="en-CA" dirty="0"/>
+          </a:p>
+        </p:txBody>
+      </p:sp>
+    </p:spTree>
+    <p:extLst>
+      <p:ext uri="{BB962C8B-B14F-4D97-AF65-F5344CB8AC3E}">
+        <p14:creationId xmlns:p14="http://schemas.microsoft.com/office/powerpoint/2010/main" val="1687622035"/>
+      </p:ext>
+    </p:extLst>
+  </p:cSld>
+  <p:clrMapOvr>
+    <a:masterClrMapping/>
+  </p:clrMapOvr>
 </p:sld>
 </file>
 
@@ -19212,8 +19806,8 @@
           <a:lstStyle/>
           <a:p>
             <a:r>
-              <a:rPr lang="en-CA" dirty="0"/>
-              <a:t>Datasets - </a:t>
+              <a:rPr lang="en-CA"/>
+              <a:t>Datasets </a:t>
             </a:r>
           </a:p>
         </p:txBody>

</xml_diff>